<commit_message>
Changes in the site and background transitions
</commit_message>
<xml_diff>
--- a/docs/diagrams.pptx
+++ b/docs/diagrams.pptx
@@ -5,7 +5,7 @@
     <p:sldMasterId id="2147483648" r:id="rId1"/>
   </p:sldMasterIdLst>
   <p:notesMasterIdLst>
-    <p:notesMasterId r:id="rId15"/>
+    <p:notesMasterId r:id="rId18"/>
   </p:notesMasterIdLst>
   <p:sldIdLst>
     <p:sldId id="256" r:id="rId2"/>
@@ -21,6 +21,9 @@
     <p:sldId id="264" r:id="rId12"/>
     <p:sldId id="265" r:id="rId13"/>
     <p:sldId id="266" r:id="rId14"/>
+    <p:sldId id="269" r:id="rId15"/>
+    <p:sldId id="270" r:id="rId16"/>
+    <p:sldId id="271" r:id="rId17"/>
   </p:sldIdLst>
   <p:sldSz cx="9144000" cy="6858000" type="screen4x3"/>
   <p:notesSz cx="6858000" cy="9144000"/>
@@ -204,7 +207,7 @@
           <a:p>
             <a:fld id="{506A5DBC-B4BE-8745-8D4D-314A9AE71DAF}" type="datetimeFigureOut">
               <a:rPr lang="en-US" smtClean="0"/>
-              <a:t>2/4/12</a:t>
+              <a:t>2/14/12</a:t>
             </a:fld>
             <a:endParaRPr lang="en-US"/>
           </a:p>
@@ -737,7 +740,7 @@
           <a:p>
             <a:fld id="{C8A96B5A-AEDD-3F4A-8AFF-D59A389E47DC}" type="datetimeFigureOut">
               <a:rPr lang="en-US" smtClean="0"/>
-              <a:t>2/4/12</a:t>
+              <a:t>2/14/12</a:t>
             </a:fld>
             <a:endParaRPr lang="en-US"/>
           </a:p>
@@ -907,7 +910,7 @@
           <a:p>
             <a:fld id="{C8A96B5A-AEDD-3F4A-8AFF-D59A389E47DC}" type="datetimeFigureOut">
               <a:rPr lang="en-US" smtClean="0"/>
-              <a:t>2/4/12</a:t>
+              <a:t>2/14/12</a:t>
             </a:fld>
             <a:endParaRPr lang="en-US"/>
           </a:p>
@@ -1087,7 +1090,7 @@
           <a:p>
             <a:fld id="{C8A96B5A-AEDD-3F4A-8AFF-D59A389E47DC}" type="datetimeFigureOut">
               <a:rPr lang="en-US" smtClean="0"/>
-              <a:t>2/4/12</a:t>
+              <a:t>2/14/12</a:t>
             </a:fld>
             <a:endParaRPr lang="en-US"/>
           </a:p>
@@ -1257,7 +1260,7 @@
           <a:p>
             <a:fld id="{C8A96B5A-AEDD-3F4A-8AFF-D59A389E47DC}" type="datetimeFigureOut">
               <a:rPr lang="en-US" smtClean="0"/>
-              <a:t>2/4/12</a:t>
+              <a:t>2/14/12</a:t>
             </a:fld>
             <a:endParaRPr lang="en-US"/>
           </a:p>
@@ -1503,7 +1506,7 @@
           <a:p>
             <a:fld id="{C8A96B5A-AEDD-3F4A-8AFF-D59A389E47DC}" type="datetimeFigureOut">
               <a:rPr lang="en-US" smtClean="0"/>
-              <a:t>2/4/12</a:t>
+              <a:t>2/14/12</a:t>
             </a:fld>
             <a:endParaRPr lang="en-US"/>
           </a:p>
@@ -1791,7 +1794,7 @@
           <a:p>
             <a:fld id="{C8A96B5A-AEDD-3F4A-8AFF-D59A389E47DC}" type="datetimeFigureOut">
               <a:rPr lang="en-US" smtClean="0"/>
-              <a:t>2/4/12</a:t>
+              <a:t>2/14/12</a:t>
             </a:fld>
             <a:endParaRPr lang="en-US"/>
           </a:p>
@@ -2213,7 +2216,7 @@
           <a:p>
             <a:fld id="{C8A96B5A-AEDD-3F4A-8AFF-D59A389E47DC}" type="datetimeFigureOut">
               <a:rPr lang="en-US" smtClean="0"/>
-              <a:t>2/4/12</a:t>
+              <a:t>2/14/12</a:t>
             </a:fld>
             <a:endParaRPr lang="en-US"/>
           </a:p>
@@ -2331,7 +2334,7 @@
           <a:p>
             <a:fld id="{C8A96B5A-AEDD-3F4A-8AFF-D59A389E47DC}" type="datetimeFigureOut">
               <a:rPr lang="en-US" smtClean="0"/>
-              <a:t>2/4/12</a:t>
+              <a:t>2/14/12</a:t>
             </a:fld>
             <a:endParaRPr lang="en-US"/>
           </a:p>
@@ -2426,7 +2429,7 @@
           <a:p>
             <a:fld id="{C8A96B5A-AEDD-3F4A-8AFF-D59A389E47DC}" type="datetimeFigureOut">
               <a:rPr lang="en-US" smtClean="0"/>
-              <a:t>2/4/12</a:t>
+              <a:t>2/14/12</a:t>
             </a:fld>
             <a:endParaRPr lang="en-US"/>
           </a:p>
@@ -2703,7 +2706,7 @@
           <a:p>
             <a:fld id="{C8A96B5A-AEDD-3F4A-8AFF-D59A389E47DC}" type="datetimeFigureOut">
               <a:rPr lang="en-US" smtClean="0"/>
-              <a:t>2/4/12</a:t>
+              <a:t>2/14/12</a:t>
             </a:fld>
             <a:endParaRPr lang="en-US"/>
           </a:p>
@@ -2956,7 +2959,7 @@
           <a:p>
             <a:fld id="{C8A96B5A-AEDD-3F4A-8AFF-D59A389E47DC}" type="datetimeFigureOut">
               <a:rPr lang="en-US" smtClean="0"/>
-              <a:t>2/4/12</a:t>
+              <a:t>2/14/12</a:t>
             </a:fld>
             <a:endParaRPr lang="en-US"/>
           </a:p>
@@ -3169,7 +3172,7 @@
           <a:p>
             <a:fld id="{C8A96B5A-AEDD-3F4A-8AFF-D59A389E47DC}" type="datetimeFigureOut">
               <a:rPr lang="en-US" smtClean="0"/>
-              <a:t>2/4/12</a:t>
+              <a:t>2/14/12</a:t>
             </a:fld>
             <a:endParaRPr lang="en-US"/>
           </a:p>
@@ -6805,6 +6808,1176 @@
     <p:extLst>
       <p:ext uri="{BB962C8B-B14F-4D97-AF65-F5344CB8AC3E}">
         <p14:creationId xmlns:p14="http://schemas.microsoft.com/office/powerpoint/2010/main" val="4150362977"/>
+      </p:ext>
+    </p:extLst>
+  </p:cSld>
+  <p:clrMapOvr>
+    <a:masterClrMapping/>
+  </p:clrMapOvr>
+</p:sld>
+</file>
+
+<file path=ppt/slides/slide14.xml><?xml version="1.0" encoding="utf-8"?>
+<p:sld xmlns:a="http://schemas.openxmlformats.org/drawingml/2006/main" xmlns:r="http://schemas.openxmlformats.org/officeDocument/2006/relationships" xmlns:p="http://schemas.openxmlformats.org/presentationml/2006/main">
+  <p:cSld>
+    <p:spTree>
+      <p:nvGrpSpPr>
+        <p:cNvPr id="1" name=""/>
+        <p:cNvGrpSpPr/>
+        <p:nvPr/>
+      </p:nvGrpSpPr>
+      <p:grpSpPr>
+        <a:xfrm>
+          <a:off x="0" y="0"/>
+          <a:ext cx="0" cy="0"/>
+          <a:chOff x="0" y="0"/>
+          <a:chExt cx="0" cy="0"/>
+        </a:xfrm>
+      </p:grpSpPr>
+    </p:spTree>
+    <p:extLst>
+      <p:ext uri="{BB962C8B-B14F-4D97-AF65-F5344CB8AC3E}">
+        <p14:creationId xmlns:p14="http://schemas.microsoft.com/office/powerpoint/2010/main" val="838832740"/>
+      </p:ext>
+    </p:extLst>
+  </p:cSld>
+  <p:clrMapOvr>
+    <a:masterClrMapping/>
+  </p:clrMapOvr>
+</p:sld>
+</file>
+
+<file path=ppt/slides/slide15.xml><?xml version="1.0" encoding="utf-8"?>
+<p:sld xmlns:a="http://schemas.openxmlformats.org/drawingml/2006/main" xmlns:r="http://schemas.openxmlformats.org/officeDocument/2006/relationships" xmlns:p="http://schemas.openxmlformats.org/presentationml/2006/main">
+  <p:cSld>
+    <p:spTree>
+      <p:nvGrpSpPr>
+        <p:cNvPr id="1" name=""/>
+        <p:cNvGrpSpPr/>
+        <p:nvPr/>
+      </p:nvGrpSpPr>
+      <p:grpSpPr>
+        <a:xfrm>
+          <a:off x="0" y="0"/>
+          <a:ext cx="0" cy="0"/>
+          <a:chOff x="0" y="0"/>
+          <a:chExt cx="0" cy="0"/>
+        </a:xfrm>
+      </p:grpSpPr>
+      <p:sp>
+        <p:nvSpPr>
+          <p:cNvPr id="17" name="Rounded Rectangle 16"/>
+          <p:cNvSpPr/>
+          <p:nvPr/>
+        </p:nvSpPr>
+        <p:spPr>
+          <a:xfrm>
+            <a:off x="4199037" y="964177"/>
+            <a:ext cx="4421339" cy="3880223"/>
+          </a:xfrm>
+          <a:prstGeom prst="roundRect">
+            <a:avLst/>
+          </a:prstGeom>
+        </p:spPr>
+        <p:style>
+          <a:lnRef idx="1">
+            <a:schemeClr val="accent6"/>
+          </a:lnRef>
+          <a:fillRef idx="2">
+            <a:schemeClr val="accent6"/>
+          </a:fillRef>
+          <a:effectRef idx="1">
+            <a:schemeClr val="accent6"/>
+          </a:effectRef>
+          <a:fontRef idx="minor">
+            <a:schemeClr val="dk1"/>
+          </a:fontRef>
+        </p:style>
+        <p:txBody>
+          <a:bodyPr rtlCol="0" anchor="t"/>
+          <a:lstStyle/>
+          <a:p>
+            <a:pPr algn="ctr"/>
+            <a:r>
+              <a:rPr lang="en-US" dirty="0" smtClean="0"/>
+              <a:t>Single Thread</a:t>
+            </a:r>
+            <a:endParaRPr lang="en-US" dirty="0"/>
+          </a:p>
+        </p:txBody>
+      </p:sp>
+      <p:sp>
+        <p:nvSpPr>
+          <p:cNvPr id="2" name="Multidocument 1"/>
+          <p:cNvSpPr/>
+          <p:nvPr/>
+        </p:nvSpPr>
+        <p:spPr>
+          <a:xfrm>
+            <a:off x="4511881" y="2269342"/>
+            <a:ext cx="1262846" cy="975935"/>
+          </a:xfrm>
+          <a:prstGeom prst="flowChartMultidocument">
+            <a:avLst/>
+          </a:prstGeom>
+        </p:spPr>
+        <p:style>
+          <a:lnRef idx="1">
+            <a:schemeClr val="accent1"/>
+          </a:lnRef>
+          <a:fillRef idx="3">
+            <a:schemeClr val="accent1"/>
+          </a:fillRef>
+          <a:effectRef idx="2">
+            <a:schemeClr val="accent1"/>
+          </a:effectRef>
+          <a:fontRef idx="minor">
+            <a:schemeClr val="lt1"/>
+          </a:fontRef>
+        </p:style>
+        <p:txBody>
+          <a:bodyPr rtlCol="0" anchor="ctr"/>
+          <a:lstStyle/>
+          <a:p>
+            <a:pPr algn="ctr"/>
+            <a:r>
+              <a:rPr lang="en-US" dirty="0" smtClean="0"/>
+              <a:t>Event Queue</a:t>
+            </a:r>
+            <a:endParaRPr lang="en-US" dirty="0"/>
+          </a:p>
+        </p:txBody>
+      </p:sp>
+      <p:sp>
+        <p:nvSpPr>
+          <p:cNvPr id="3" name="Rounded Rectangle 2"/>
+          <p:cNvSpPr/>
+          <p:nvPr/>
+        </p:nvSpPr>
+        <p:spPr>
+          <a:xfrm>
+            <a:off x="4511881" y="3750882"/>
+            <a:ext cx="1262846" cy="693737"/>
+          </a:xfrm>
+          <a:prstGeom prst="roundRect">
+            <a:avLst/>
+          </a:prstGeom>
+        </p:spPr>
+        <p:style>
+          <a:lnRef idx="1">
+            <a:schemeClr val="accent1"/>
+          </a:lnRef>
+          <a:fillRef idx="3">
+            <a:schemeClr val="accent1"/>
+          </a:fillRef>
+          <a:effectRef idx="2">
+            <a:schemeClr val="accent1"/>
+          </a:effectRef>
+          <a:fontRef idx="minor">
+            <a:schemeClr val="lt1"/>
+          </a:fontRef>
+        </p:style>
+        <p:txBody>
+          <a:bodyPr rtlCol="0" anchor="ctr"/>
+          <a:lstStyle/>
+          <a:p>
+            <a:pPr algn="ctr"/>
+            <a:r>
+              <a:rPr lang="en-US" dirty="0" smtClean="0"/>
+              <a:t>Event Loop</a:t>
+            </a:r>
+            <a:endParaRPr lang="en-US" dirty="0"/>
+          </a:p>
+        </p:txBody>
+      </p:sp>
+      <p:cxnSp>
+        <p:nvCxnSpPr>
+          <p:cNvPr id="5" name="Straight Arrow Connector 4"/>
+          <p:cNvCxnSpPr/>
+          <p:nvPr/>
+        </p:nvCxnSpPr>
+        <p:spPr>
+          <a:xfrm>
+            <a:off x="5143304" y="1669672"/>
+            <a:ext cx="0" cy="599670"/>
+          </a:xfrm>
+          <a:prstGeom prst="straightConnector1">
+            <a:avLst/>
+          </a:prstGeom>
+          <a:ln>
+            <a:tailEnd type="arrow"/>
+          </a:ln>
+        </p:spPr>
+        <p:style>
+          <a:lnRef idx="2">
+            <a:schemeClr val="dk1"/>
+          </a:lnRef>
+          <a:fillRef idx="0">
+            <a:schemeClr val="dk1"/>
+          </a:fillRef>
+          <a:effectRef idx="1">
+            <a:schemeClr val="dk1"/>
+          </a:effectRef>
+          <a:fontRef idx="minor">
+            <a:schemeClr val="tx1"/>
+          </a:fontRef>
+        </p:style>
+      </p:cxnSp>
+      <p:sp>
+        <p:nvSpPr>
+          <p:cNvPr id="7" name="TextBox 6"/>
+          <p:cNvSpPr txBox="1"/>
+          <p:nvPr/>
+        </p:nvSpPr>
+        <p:spPr>
+          <a:xfrm>
+            <a:off x="4740621" y="1300340"/>
+            <a:ext cx="805366" cy="369332"/>
+          </a:xfrm>
+          <a:prstGeom prst="rect">
+            <a:avLst/>
+          </a:prstGeom>
+          <a:noFill/>
+        </p:spPr>
+        <p:txBody>
+          <a:bodyPr wrap="none" rtlCol="0">
+            <a:spAutoFit/>
+          </a:bodyPr>
+          <a:lstStyle/>
+          <a:p>
+            <a:r>
+              <a:rPr lang="en-US" dirty="0" smtClean="0"/>
+              <a:t>Events</a:t>
+            </a:r>
+            <a:endParaRPr lang="en-US" dirty="0"/>
+          </a:p>
+        </p:txBody>
+      </p:sp>
+      <p:cxnSp>
+        <p:nvCxnSpPr>
+          <p:cNvPr id="9" name="Straight Arrow Connector 8"/>
+          <p:cNvCxnSpPr>
+            <a:endCxn id="3" idx="0"/>
+          </p:cNvCxnSpPr>
+          <p:nvPr/>
+        </p:nvCxnSpPr>
+        <p:spPr>
+          <a:xfrm>
+            <a:off x="5143304" y="3245277"/>
+            <a:ext cx="0" cy="505605"/>
+          </a:xfrm>
+          <a:prstGeom prst="straightConnector1">
+            <a:avLst/>
+          </a:prstGeom>
+          <a:ln>
+            <a:tailEnd type="arrow"/>
+          </a:ln>
+        </p:spPr>
+        <p:style>
+          <a:lnRef idx="2">
+            <a:schemeClr val="dk1"/>
+          </a:lnRef>
+          <a:fillRef idx="0">
+            <a:schemeClr val="dk1"/>
+          </a:fillRef>
+          <a:effectRef idx="1">
+            <a:schemeClr val="dk1"/>
+          </a:effectRef>
+          <a:fontRef idx="minor">
+            <a:schemeClr val="tx1"/>
+          </a:fontRef>
+        </p:style>
+      </p:cxnSp>
+      <p:sp>
+        <p:nvSpPr>
+          <p:cNvPr id="12" name="Rounded Rectangle 11"/>
+          <p:cNvSpPr/>
+          <p:nvPr/>
+        </p:nvSpPr>
+        <p:spPr>
+          <a:xfrm>
+            <a:off x="7114774" y="3726908"/>
+            <a:ext cx="1270425" cy="717711"/>
+          </a:xfrm>
+          <a:prstGeom prst="roundRect">
+            <a:avLst/>
+          </a:prstGeom>
+        </p:spPr>
+        <p:style>
+          <a:lnRef idx="1">
+            <a:schemeClr val="accent1"/>
+          </a:lnRef>
+          <a:fillRef idx="3">
+            <a:schemeClr val="accent1"/>
+          </a:fillRef>
+          <a:effectRef idx="2">
+            <a:schemeClr val="accent1"/>
+          </a:effectRef>
+          <a:fontRef idx="minor">
+            <a:schemeClr val="lt1"/>
+          </a:fontRef>
+        </p:style>
+        <p:txBody>
+          <a:bodyPr rtlCol="0" anchor="ctr"/>
+          <a:lstStyle/>
+          <a:p>
+            <a:pPr algn="ctr"/>
+            <a:r>
+              <a:rPr lang="en-US" dirty="0" smtClean="0"/>
+              <a:t>Callbacks</a:t>
+            </a:r>
+            <a:endParaRPr lang="en-US" dirty="0"/>
+          </a:p>
+        </p:txBody>
+      </p:sp>
+      <p:sp>
+        <p:nvSpPr>
+          <p:cNvPr id="13" name="Curved Left Arrow 12"/>
+          <p:cNvSpPr/>
+          <p:nvPr/>
+        </p:nvSpPr>
+        <p:spPr>
+          <a:xfrm>
+            <a:off x="6033422" y="3856707"/>
+            <a:ext cx="952470" cy="587912"/>
+          </a:xfrm>
+          <a:prstGeom prst="curvedLeftArrow">
+            <a:avLst/>
+          </a:prstGeom>
+        </p:spPr>
+        <p:style>
+          <a:lnRef idx="1">
+            <a:schemeClr val="accent1"/>
+          </a:lnRef>
+          <a:fillRef idx="3">
+            <a:schemeClr val="accent1"/>
+          </a:fillRef>
+          <a:effectRef idx="2">
+            <a:schemeClr val="accent1"/>
+          </a:effectRef>
+          <a:fontRef idx="minor">
+            <a:schemeClr val="lt1"/>
+          </a:fontRef>
+        </p:style>
+        <p:txBody>
+          <a:bodyPr rtlCol="0" anchor="ctr"/>
+          <a:lstStyle/>
+          <a:p>
+            <a:pPr algn="ctr"/>
+            <a:endParaRPr lang="en-US">
+              <a:solidFill>
+                <a:schemeClr val="tx1"/>
+              </a:solidFill>
+            </a:endParaRPr>
+          </a:p>
+        </p:txBody>
+      </p:sp>
+      <p:sp>
+        <p:nvSpPr>
+          <p:cNvPr id="18" name="Rounded Rectangle 17"/>
+          <p:cNvSpPr/>
+          <p:nvPr/>
+        </p:nvSpPr>
+        <p:spPr>
+          <a:xfrm>
+            <a:off x="7114775" y="5255939"/>
+            <a:ext cx="1270424" cy="623187"/>
+          </a:xfrm>
+          <a:prstGeom prst="roundRect">
+            <a:avLst/>
+          </a:prstGeom>
+        </p:spPr>
+        <p:style>
+          <a:lnRef idx="1">
+            <a:schemeClr val="accent1"/>
+          </a:lnRef>
+          <a:fillRef idx="3">
+            <a:schemeClr val="accent1"/>
+          </a:fillRef>
+          <a:effectRef idx="2">
+            <a:schemeClr val="accent1"/>
+          </a:effectRef>
+          <a:fontRef idx="minor">
+            <a:schemeClr val="lt1"/>
+          </a:fontRef>
+        </p:style>
+        <p:txBody>
+          <a:bodyPr rtlCol="0" anchor="ctr"/>
+          <a:lstStyle/>
+          <a:p>
+            <a:pPr algn="ctr"/>
+            <a:r>
+              <a:rPr lang="en-US" dirty="0" smtClean="0"/>
+              <a:t>DOM</a:t>
+            </a:r>
+            <a:endParaRPr lang="en-US" dirty="0"/>
+          </a:p>
+        </p:txBody>
+      </p:sp>
+      <p:cxnSp>
+        <p:nvCxnSpPr>
+          <p:cNvPr id="20" name="Straight Arrow Connector 19"/>
+          <p:cNvCxnSpPr>
+            <a:stCxn id="12" idx="2"/>
+            <a:endCxn id="18" idx="0"/>
+          </p:cNvCxnSpPr>
+          <p:nvPr/>
+        </p:nvCxnSpPr>
+        <p:spPr>
+          <a:xfrm>
+            <a:off x="7749987" y="4444619"/>
+            <a:ext cx="0" cy="811320"/>
+          </a:xfrm>
+          <a:prstGeom prst="straightConnector1">
+            <a:avLst/>
+          </a:prstGeom>
+          <a:ln>
+            <a:tailEnd type="arrow"/>
+          </a:ln>
+        </p:spPr>
+        <p:style>
+          <a:lnRef idx="2">
+            <a:schemeClr val="dk1"/>
+          </a:lnRef>
+          <a:fillRef idx="0">
+            <a:schemeClr val="dk1"/>
+          </a:fillRef>
+          <a:effectRef idx="1">
+            <a:schemeClr val="dk1"/>
+          </a:effectRef>
+          <a:fontRef idx="minor">
+            <a:schemeClr val="tx1"/>
+          </a:fontRef>
+        </p:style>
+      </p:cxnSp>
+    </p:spTree>
+    <p:extLst>
+      <p:ext uri="{BB962C8B-B14F-4D97-AF65-F5344CB8AC3E}">
+        <p14:creationId xmlns:p14="http://schemas.microsoft.com/office/powerpoint/2010/main" val="4165343396"/>
+      </p:ext>
+    </p:extLst>
+  </p:cSld>
+  <p:clrMapOvr>
+    <a:masterClrMapping/>
+  </p:clrMapOvr>
+</p:sld>
+</file>
+
+<file path=ppt/slides/slide16.xml><?xml version="1.0" encoding="utf-8"?>
+<p:sld xmlns:a="http://schemas.openxmlformats.org/drawingml/2006/main" xmlns:r="http://schemas.openxmlformats.org/officeDocument/2006/relationships" xmlns:p="http://schemas.openxmlformats.org/presentationml/2006/main">
+  <p:cSld>
+    <p:spTree>
+      <p:nvGrpSpPr>
+        <p:cNvPr id="1" name=""/>
+        <p:cNvGrpSpPr/>
+        <p:nvPr/>
+      </p:nvGrpSpPr>
+      <p:grpSpPr>
+        <a:xfrm>
+          <a:off x="0" y="0"/>
+          <a:ext cx="0" cy="0"/>
+          <a:chOff x="0" y="0"/>
+          <a:chExt cx="0" cy="0"/>
+        </a:xfrm>
+      </p:grpSpPr>
+      <p:sp>
+        <p:nvSpPr>
+          <p:cNvPr id="2" name="Rounded Rectangle 1"/>
+          <p:cNvSpPr/>
+          <p:nvPr/>
+        </p:nvSpPr>
+        <p:spPr>
+          <a:xfrm>
+            <a:off x="4199037" y="964177"/>
+            <a:ext cx="4421339" cy="3880223"/>
+          </a:xfrm>
+          <a:prstGeom prst="roundRect">
+            <a:avLst/>
+          </a:prstGeom>
+        </p:spPr>
+        <p:style>
+          <a:lnRef idx="1">
+            <a:schemeClr val="accent6"/>
+          </a:lnRef>
+          <a:fillRef idx="2">
+            <a:schemeClr val="accent6"/>
+          </a:fillRef>
+          <a:effectRef idx="1">
+            <a:schemeClr val="accent6"/>
+          </a:effectRef>
+          <a:fontRef idx="minor">
+            <a:schemeClr val="dk1"/>
+          </a:fontRef>
+        </p:style>
+        <p:txBody>
+          <a:bodyPr rtlCol="0" anchor="t"/>
+          <a:lstStyle/>
+          <a:p>
+            <a:pPr algn="ctr"/>
+            <a:r>
+              <a:rPr lang="en-US" dirty="0" smtClean="0"/>
+              <a:t>Main Thread</a:t>
+            </a:r>
+            <a:endParaRPr lang="en-US" dirty="0"/>
+          </a:p>
+        </p:txBody>
+      </p:sp>
+      <p:sp>
+        <p:nvSpPr>
+          <p:cNvPr id="3" name="Multidocument 2"/>
+          <p:cNvSpPr/>
+          <p:nvPr/>
+        </p:nvSpPr>
+        <p:spPr>
+          <a:xfrm>
+            <a:off x="4511881" y="2269342"/>
+            <a:ext cx="1262846" cy="975935"/>
+          </a:xfrm>
+          <a:prstGeom prst="flowChartMultidocument">
+            <a:avLst/>
+          </a:prstGeom>
+        </p:spPr>
+        <p:style>
+          <a:lnRef idx="1">
+            <a:schemeClr val="accent1"/>
+          </a:lnRef>
+          <a:fillRef idx="3">
+            <a:schemeClr val="accent1"/>
+          </a:fillRef>
+          <a:effectRef idx="2">
+            <a:schemeClr val="accent1"/>
+          </a:effectRef>
+          <a:fontRef idx="minor">
+            <a:schemeClr val="lt1"/>
+          </a:fontRef>
+        </p:style>
+        <p:txBody>
+          <a:bodyPr rtlCol="0" anchor="ctr"/>
+          <a:lstStyle/>
+          <a:p>
+            <a:pPr algn="ctr"/>
+            <a:r>
+              <a:rPr lang="en-US" dirty="0" smtClean="0"/>
+              <a:t>Event Queue</a:t>
+            </a:r>
+            <a:endParaRPr lang="en-US" dirty="0"/>
+          </a:p>
+        </p:txBody>
+      </p:sp>
+      <p:sp>
+        <p:nvSpPr>
+          <p:cNvPr id="4" name="Rounded Rectangle 3"/>
+          <p:cNvSpPr/>
+          <p:nvPr/>
+        </p:nvSpPr>
+        <p:spPr>
+          <a:xfrm>
+            <a:off x="4511881" y="3750882"/>
+            <a:ext cx="1262846" cy="693737"/>
+          </a:xfrm>
+          <a:prstGeom prst="roundRect">
+            <a:avLst/>
+          </a:prstGeom>
+        </p:spPr>
+        <p:style>
+          <a:lnRef idx="1">
+            <a:schemeClr val="accent1"/>
+          </a:lnRef>
+          <a:fillRef idx="3">
+            <a:schemeClr val="accent1"/>
+          </a:fillRef>
+          <a:effectRef idx="2">
+            <a:schemeClr val="accent1"/>
+          </a:effectRef>
+          <a:fontRef idx="minor">
+            <a:schemeClr val="lt1"/>
+          </a:fontRef>
+        </p:style>
+        <p:txBody>
+          <a:bodyPr rtlCol="0" anchor="ctr"/>
+          <a:lstStyle/>
+          <a:p>
+            <a:pPr algn="ctr"/>
+            <a:r>
+              <a:rPr lang="en-US" dirty="0" smtClean="0"/>
+              <a:t>Event Loop</a:t>
+            </a:r>
+            <a:endParaRPr lang="en-US" dirty="0"/>
+          </a:p>
+        </p:txBody>
+      </p:sp>
+      <p:cxnSp>
+        <p:nvCxnSpPr>
+          <p:cNvPr id="5" name="Straight Arrow Connector 4"/>
+          <p:cNvCxnSpPr/>
+          <p:nvPr/>
+        </p:nvCxnSpPr>
+        <p:spPr>
+          <a:xfrm>
+            <a:off x="5143304" y="1846042"/>
+            <a:ext cx="0" cy="423300"/>
+          </a:xfrm>
+          <a:prstGeom prst="straightConnector1">
+            <a:avLst/>
+          </a:prstGeom>
+          <a:ln>
+            <a:tailEnd type="arrow"/>
+          </a:ln>
+        </p:spPr>
+        <p:style>
+          <a:lnRef idx="2">
+            <a:schemeClr val="dk1"/>
+          </a:lnRef>
+          <a:fillRef idx="0">
+            <a:schemeClr val="dk1"/>
+          </a:fillRef>
+          <a:effectRef idx="1">
+            <a:schemeClr val="dk1"/>
+          </a:effectRef>
+          <a:fontRef idx="minor">
+            <a:schemeClr val="tx1"/>
+          </a:fontRef>
+        </p:style>
+      </p:cxnSp>
+      <p:sp>
+        <p:nvSpPr>
+          <p:cNvPr id="6" name="TextBox 5"/>
+          <p:cNvSpPr txBox="1"/>
+          <p:nvPr/>
+        </p:nvSpPr>
+        <p:spPr>
+          <a:xfrm>
+            <a:off x="4740621" y="1476710"/>
+            <a:ext cx="805366" cy="369332"/>
+          </a:xfrm>
+          <a:prstGeom prst="rect">
+            <a:avLst/>
+          </a:prstGeom>
+          <a:noFill/>
+        </p:spPr>
+        <p:txBody>
+          <a:bodyPr wrap="none" rtlCol="0">
+            <a:spAutoFit/>
+          </a:bodyPr>
+          <a:lstStyle/>
+          <a:p>
+            <a:r>
+              <a:rPr lang="en-US" dirty="0" smtClean="0"/>
+              <a:t>Events</a:t>
+            </a:r>
+            <a:endParaRPr lang="en-US" dirty="0"/>
+          </a:p>
+        </p:txBody>
+      </p:sp>
+      <p:cxnSp>
+        <p:nvCxnSpPr>
+          <p:cNvPr id="7" name="Straight Arrow Connector 6"/>
+          <p:cNvCxnSpPr>
+            <a:endCxn id="4" idx="0"/>
+          </p:cNvCxnSpPr>
+          <p:nvPr/>
+        </p:nvCxnSpPr>
+        <p:spPr>
+          <a:xfrm>
+            <a:off x="5143304" y="3245277"/>
+            <a:ext cx="0" cy="505605"/>
+          </a:xfrm>
+          <a:prstGeom prst="straightConnector1">
+            <a:avLst/>
+          </a:prstGeom>
+          <a:ln>
+            <a:tailEnd type="arrow"/>
+          </a:ln>
+        </p:spPr>
+        <p:style>
+          <a:lnRef idx="2">
+            <a:schemeClr val="dk1"/>
+          </a:lnRef>
+          <a:fillRef idx="0">
+            <a:schemeClr val="dk1"/>
+          </a:fillRef>
+          <a:effectRef idx="1">
+            <a:schemeClr val="dk1"/>
+          </a:effectRef>
+          <a:fontRef idx="minor">
+            <a:schemeClr val="tx1"/>
+          </a:fontRef>
+        </p:style>
+      </p:cxnSp>
+      <p:sp>
+        <p:nvSpPr>
+          <p:cNvPr id="8" name="Rounded Rectangle 7"/>
+          <p:cNvSpPr/>
+          <p:nvPr/>
+        </p:nvSpPr>
+        <p:spPr>
+          <a:xfrm>
+            <a:off x="7114774" y="3726908"/>
+            <a:ext cx="1270425" cy="717711"/>
+          </a:xfrm>
+          <a:prstGeom prst="roundRect">
+            <a:avLst/>
+          </a:prstGeom>
+        </p:spPr>
+        <p:style>
+          <a:lnRef idx="1">
+            <a:schemeClr val="accent1"/>
+          </a:lnRef>
+          <a:fillRef idx="3">
+            <a:schemeClr val="accent1"/>
+          </a:fillRef>
+          <a:effectRef idx="2">
+            <a:schemeClr val="accent1"/>
+          </a:effectRef>
+          <a:fontRef idx="minor">
+            <a:schemeClr val="lt1"/>
+          </a:fontRef>
+        </p:style>
+        <p:txBody>
+          <a:bodyPr rtlCol="0" anchor="ctr"/>
+          <a:lstStyle/>
+          <a:p>
+            <a:pPr algn="ctr"/>
+            <a:r>
+              <a:rPr lang="en-US" dirty="0" smtClean="0"/>
+              <a:t>Callbacks</a:t>
+            </a:r>
+            <a:endParaRPr lang="en-US" dirty="0"/>
+          </a:p>
+        </p:txBody>
+      </p:sp>
+      <p:sp>
+        <p:nvSpPr>
+          <p:cNvPr id="9" name="Curved Left Arrow 8"/>
+          <p:cNvSpPr/>
+          <p:nvPr/>
+        </p:nvSpPr>
+        <p:spPr>
+          <a:xfrm>
+            <a:off x="6033422" y="3856707"/>
+            <a:ext cx="952470" cy="587912"/>
+          </a:xfrm>
+          <a:prstGeom prst="curvedLeftArrow">
+            <a:avLst/>
+          </a:prstGeom>
+        </p:spPr>
+        <p:style>
+          <a:lnRef idx="1">
+            <a:schemeClr val="accent1"/>
+          </a:lnRef>
+          <a:fillRef idx="3">
+            <a:schemeClr val="accent1"/>
+          </a:fillRef>
+          <a:effectRef idx="2">
+            <a:schemeClr val="accent1"/>
+          </a:effectRef>
+          <a:fontRef idx="minor">
+            <a:schemeClr val="lt1"/>
+          </a:fontRef>
+        </p:style>
+        <p:txBody>
+          <a:bodyPr rtlCol="0" anchor="ctr"/>
+          <a:lstStyle/>
+          <a:p>
+            <a:pPr algn="ctr"/>
+            <a:endParaRPr lang="en-US">
+              <a:solidFill>
+                <a:schemeClr val="tx1"/>
+              </a:solidFill>
+            </a:endParaRPr>
+          </a:p>
+        </p:txBody>
+      </p:sp>
+      <p:sp>
+        <p:nvSpPr>
+          <p:cNvPr id="10" name="Rounded Rectangle 9"/>
+          <p:cNvSpPr/>
+          <p:nvPr/>
+        </p:nvSpPr>
+        <p:spPr>
+          <a:xfrm>
+            <a:off x="7114775" y="5255939"/>
+            <a:ext cx="1270424" cy="623187"/>
+          </a:xfrm>
+          <a:prstGeom prst="roundRect">
+            <a:avLst/>
+          </a:prstGeom>
+        </p:spPr>
+        <p:style>
+          <a:lnRef idx="1">
+            <a:schemeClr val="accent1"/>
+          </a:lnRef>
+          <a:fillRef idx="3">
+            <a:schemeClr val="accent1"/>
+          </a:fillRef>
+          <a:effectRef idx="2">
+            <a:schemeClr val="accent1"/>
+          </a:effectRef>
+          <a:fontRef idx="minor">
+            <a:schemeClr val="lt1"/>
+          </a:fontRef>
+        </p:style>
+        <p:txBody>
+          <a:bodyPr rtlCol="0" anchor="ctr"/>
+          <a:lstStyle/>
+          <a:p>
+            <a:pPr algn="ctr"/>
+            <a:r>
+              <a:rPr lang="en-US" dirty="0" smtClean="0"/>
+              <a:t>DOM</a:t>
+            </a:r>
+            <a:endParaRPr lang="en-US" dirty="0"/>
+          </a:p>
+        </p:txBody>
+      </p:sp>
+      <p:cxnSp>
+        <p:nvCxnSpPr>
+          <p:cNvPr id="11" name="Straight Arrow Connector 10"/>
+          <p:cNvCxnSpPr>
+            <a:stCxn id="8" idx="2"/>
+            <a:endCxn id="10" idx="0"/>
+          </p:cNvCxnSpPr>
+          <p:nvPr/>
+        </p:nvCxnSpPr>
+        <p:spPr>
+          <a:xfrm>
+            <a:off x="7749987" y="4444619"/>
+            <a:ext cx="0" cy="811320"/>
+          </a:xfrm>
+          <a:prstGeom prst="straightConnector1">
+            <a:avLst/>
+          </a:prstGeom>
+          <a:ln>
+            <a:tailEnd type="arrow"/>
+          </a:ln>
+        </p:spPr>
+        <p:style>
+          <a:lnRef idx="2">
+            <a:schemeClr val="dk1"/>
+          </a:lnRef>
+          <a:fillRef idx="0">
+            <a:schemeClr val="dk1"/>
+          </a:fillRef>
+          <a:effectRef idx="1">
+            <a:schemeClr val="dk1"/>
+          </a:effectRef>
+          <a:fontRef idx="minor">
+            <a:schemeClr val="tx1"/>
+          </a:fontRef>
+        </p:style>
+      </p:cxnSp>
+      <p:sp>
+        <p:nvSpPr>
+          <p:cNvPr id="12" name="Rounded Rectangle 11"/>
+          <p:cNvSpPr/>
+          <p:nvPr/>
+        </p:nvSpPr>
+        <p:spPr>
+          <a:xfrm>
+            <a:off x="-752570" y="964177"/>
+            <a:ext cx="4421339" cy="3880223"/>
+          </a:xfrm>
+          <a:prstGeom prst="roundRect">
+            <a:avLst/>
+          </a:prstGeom>
+        </p:spPr>
+        <p:style>
+          <a:lnRef idx="1">
+            <a:schemeClr val="accent3"/>
+          </a:lnRef>
+          <a:fillRef idx="2">
+            <a:schemeClr val="accent3"/>
+          </a:fillRef>
+          <a:effectRef idx="1">
+            <a:schemeClr val="accent3"/>
+          </a:effectRef>
+          <a:fontRef idx="minor">
+            <a:schemeClr val="dk1"/>
+          </a:fontRef>
+        </p:style>
+        <p:txBody>
+          <a:bodyPr rtlCol="0" anchor="t"/>
+          <a:lstStyle/>
+          <a:p>
+            <a:pPr algn="ctr"/>
+            <a:r>
+              <a:rPr lang="en-US" dirty="0" smtClean="0"/>
+              <a:t>Web Worker Thread</a:t>
+            </a:r>
+            <a:endParaRPr lang="en-US" dirty="0"/>
+          </a:p>
+        </p:txBody>
+      </p:sp>
+      <p:sp>
+        <p:nvSpPr>
+          <p:cNvPr id="13" name="Multidocument 12"/>
+          <p:cNvSpPr/>
+          <p:nvPr/>
+        </p:nvSpPr>
+        <p:spPr>
+          <a:xfrm>
+            <a:off x="-439726" y="2269342"/>
+            <a:ext cx="1262846" cy="975935"/>
+          </a:xfrm>
+          <a:prstGeom prst="flowChartMultidocument">
+            <a:avLst/>
+          </a:prstGeom>
+        </p:spPr>
+        <p:style>
+          <a:lnRef idx="1">
+            <a:schemeClr val="accent1"/>
+          </a:lnRef>
+          <a:fillRef idx="3">
+            <a:schemeClr val="accent1"/>
+          </a:fillRef>
+          <a:effectRef idx="2">
+            <a:schemeClr val="accent1"/>
+          </a:effectRef>
+          <a:fontRef idx="minor">
+            <a:schemeClr val="lt1"/>
+          </a:fontRef>
+        </p:style>
+        <p:txBody>
+          <a:bodyPr rtlCol="0" anchor="ctr"/>
+          <a:lstStyle/>
+          <a:p>
+            <a:pPr algn="ctr"/>
+            <a:r>
+              <a:rPr lang="en-US" dirty="0" smtClean="0"/>
+              <a:t>Event Queue</a:t>
+            </a:r>
+            <a:endParaRPr lang="en-US" dirty="0"/>
+          </a:p>
+        </p:txBody>
+      </p:sp>
+      <p:sp>
+        <p:nvSpPr>
+          <p:cNvPr id="14" name="Rounded Rectangle 13"/>
+          <p:cNvSpPr/>
+          <p:nvPr/>
+        </p:nvSpPr>
+        <p:spPr>
+          <a:xfrm>
+            <a:off x="-439726" y="3750882"/>
+            <a:ext cx="1262846" cy="693737"/>
+          </a:xfrm>
+          <a:prstGeom prst="roundRect">
+            <a:avLst/>
+          </a:prstGeom>
+        </p:spPr>
+        <p:style>
+          <a:lnRef idx="1">
+            <a:schemeClr val="accent1"/>
+          </a:lnRef>
+          <a:fillRef idx="3">
+            <a:schemeClr val="accent1"/>
+          </a:fillRef>
+          <a:effectRef idx="2">
+            <a:schemeClr val="accent1"/>
+          </a:effectRef>
+          <a:fontRef idx="minor">
+            <a:schemeClr val="lt1"/>
+          </a:fontRef>
+        </p:style>
+        <p:txBody>
+          <a:bodyPr rtlCol="0" anchor="ctr"/>
+          <a:lstStyle/>
+          <a:p>
+            <a:pPr algn="ctr"/>
+            <a:r>
+              <a:rPr lang="en-US" dirty="0" smtClean="0"/>
+              <a:t>Event Loop</a:t>
+            </a:r>
+            <a:endParaRPr lang="en-US" dirty="0"/>
+          </a:p>
+        </p:txBody>
+      </p:sp>
+      <p:cxnSp>
+        <p:nvCxnSpPr>
+          <p:cNvPr id="15" name="Straight Arrow Connector 14"/>
+          <p:cNvCxnSpPr/>
+          <p:nvPr/>
+        </p:nvCxnSpPr>
+        <p:spPr>
+          <a:xfrm>
+            <a:off x="191697" y="1846045"/>
+            <a:ext cx="0" cy="423297"/>
+          </a:xfrm>
+          <a:prstGeom prst="straightConnector1">
+            <a:avLst/>
+          </a:prstGeom>
+          <a:ln>
+            <a:tailEnd type="arrow"/>
+          </a:ln>
+        </p:spPr>
+        <p:style>
+          <a:lnRef idx="2">
+            <a:schemeClr val="dk1"/>
+          </a:lnRef>
+          <a:fillRef idx="0">
+            <a:schemeClr val="dk1"/>
+          </a:fillRef>
+          <a:effectRef idx="1">
+            <a:schemeClr val="dk1"/>
+          </a:effectRef>
+          <a:fontRef idx="minor">
+            <a:schemeClr val="tx1"/>
+          </a:fontRef>
+        </p:style>
+      </p:cxnSp>
+      <p:sp>
+        <p:nvSpPr>
+          <p:cNvPr id="16" name="TextBox 15"/>
+          <p:cNvSpPr txBox="1"/>
+          <p:nvPr/>
+        </p:nvSpPr>
+        <p:spPr>
+          <a:xfrm>
+            <a:off x="-210986" y="1476710"/>
+            <a:ext cx="805366" cy="369332"/>
+          </a:xfrm>
+          <a:prstGeom prst="rect">
+            <a:avLst/>
+          </a:prstGeom>
+          <a:noFill/>
+        </p:spPr>
+        <p:txBody>
+          <a:bodyPr wrap="none" rtlCol="0">
+            <a:spAutoFit/>
+          </a:bodyPr>
+          <a:lstStyle/>
+          <a:p>
+            <a:r>
+              <a:rPr lang="en-US" dirty="0" smtClean="0"/>
+              <a:t>Events</a:t>
+            </a:r>
+            <a:endParaRPr lang="en-US" dirty="0"/>
+          </a:p>
+        </p:txBody>
+      </p:sp>
+      <p:cxnSp>
+        <p:nvCxnSpPr>
+          <p:cNvPr id="17" name="Straight Arrow Connector 16"/>
+          <p:cNvCxnSpPr>
+            <a:endCxn id="14" idx="0"/>
+          </p:cNvCxnSpPr>
+          <p:nvPr/>
+        </p:nvCxnSpPr>
+        <p:spPr>
+          <a:xfrm>
+            <a:off x="191697" y="3245277"/>
+            <a:ext cx="0" cy="505605"/>
+          </a:xfrm>
+          <a:prstGeom prst="straightConnector1">
+            <a:avLst/>
+          </a:prstGeom>
+          <a:ln>
+            <a:tailEnd type="arrow"/>
+          </a:ln>
+        </p:spPr>
+        <p:style>
+          <a:lnRef idx="2">
+            <a:schemeClr val="dk1"/>
+          </a:lnRef>
+          <a:fillRef idx="0">
+            <a:schemeClr val="dk1"/>
+          </a:fillRef>
+          <a:effectRef idx="1">
+            <a:schemeClr val="dk1"/>
+          </a:effectRef>
+          <a:fontRef idx="minor">
+            <a:schemeClr val="tx1"/>
+          </a:fontRef>
+        </p:style>
+      </p:cxnSp>
+      <p:sp>
+        <p:nvSpPr>
+          <p:cNvPr id="18" name="Rounded Rectangle 17"/>
+          <p:cNvSpPr/>
+          <p:nvPr/>
+        </p:nvSpPr>
+        <p:spPr>
+          <a:xfrm>
+            <a:off x="2163167" y="3726908"/>
+            <a:ext cx="1270425" cy="717711"/>
+          </a:xfrm>
+          <a:prstGeom prst="roundRect">
+            <a:avLst/>
+          </a:prstGeom>
+        </p:spPr>
+        <p:style>
+          <a:lnRef idx="1">
+            <a:schemeClr val="accent1"/>
+          </a:lnRef>
+          <a:fillRef idx="3">
+            <a:schemeClr val="accent1"/>
+          </a:fillRef>
+          <a:effectRef idx="2">
+            <a:schemeClr val="accent1"/>
+          </a:effectRef>
+          <a:fontRef idx="minor">
+            <a:schemeClr val="lt1"/>
+          </a:fontRef>
+        </p:style>
+        <p:txBody>
+          <a:bodyPr rtlCol="0" anchor="ctr"/>
+          <a:lstStyle/>
+          <a:p>
+            <a:pPr algn="ctr"/>
+            <a:r>
+              <a:rPr lang="en-US" dirty="0" smtClean="0"/>
+              <a:t>Callbacks</a:t>
+            </a:r>
+            <a:endParaRPr lang="en-US" dirty="0"/>
+          </a:p>
+        </p:txBody>
+      </p:sp>
+      <p:sp>
+        <p:nvSpPr>
+          <p:cNvPr id="19" name="Curved Left Arrow 18"/>
+          <p:cNvSpPr/>
+          <p:nvPr/>
+        </p:nvSpPr>
+        <p:spPr>
+          <a:xfrm>
+            <a:off x="1081815" y="3856707"/>
+            <a:ext cx="952470" cy="587912"/>
+          </a:xfrm>
+          <a:prstGeom prst="curvedLeftArrow">
+            <a:avLst/>
+          </a:prstGeom>
+        </p:spPr>
+        <p:style>
+          <a:lnRef idx="1">
+            <a:schemeClr val="accent1"/>
+          </a:lnRef>
+          <a:fillRef idx="3">
+            <a:schemeClr val="accent1"/>
+          </a:fillRef>
+          <a:effectRef idx="2">
+            <a:schemeClr val="accent1"/>
+          </a:effectRef>
+          <a:fontRef idx="minor">
+            <a:schemeClr val="lt1"/>
+          </a:fontRef>
+        </p:style>
+        <p:txBody>
+          <a:bodyPr rtlCol="0" anchor="ctr"/>
+          <a:lstStyle/>
+          <a:p>
+            <a:pPr algn="ctr"/>
+            <a:endParaRPr lang="en-US">
+              <a:solidFill>
+                <a:schemeClr val="tx1"/>
+              </a:solidFill>
+            </a:endParaRPr>
+          </a:p>
+        </p:txBody>
+      </p:sp>
+    </p:spTree>
+    <p:extLst>
+      <p:ext uri="{BB962C8B-B14F-4D97-AF65-F5344CB8AC3E}">
+        <p14:creationId xmlns:p14="http://schemas.microsoft.com/office/powerpoint/2010/main" val="3444498268"/>
       </p:ext>
     </p:extLst>
   </p:cSld>

</xml_diff>

<commit_message>
Added talks for feb 2013
</commit_message>
<xml_diff>
--- a/docs/diagrams.pptx
+++ b/docs/diagrams.pptx
@@ -5,7 +5,7 @@
     <p:sldMasterId id="2147483648" r:id="rId1"/>
   </p:sldMasterIdLst>
   <p:notesMasterIdLst>
-    <p:notesMasterId r:id="rId33"/>
+    <p:notesMasterId r:id="rId34"/>
   </p:notesMasterIdLst>
   <p:sldIdLst>
     <p:sldId id="256" r:id="rId2"/>
@@ -39,6 +39,7 @@
     <p:sldId id="271" r:id="rId30"/>
     <p:sldId id="284" r:id="rId31"/>
     <p:sldId id="286" r:id="rId32"/>
+    <p:sldId id="287" r:id="rId33"/>
   </p:sldIdLst>
   <p:sldSz cx="9144000" cy="6858000" type="screen4x3"/>
   <p:notesSz cx="6858000" cy="9144000"/>
@@ -222,7 +223,7 @@
           <a:p>
             <a:fld id="{506A5DBC-B4BE-8745-8D4D-314A9AE71DAF}" type="datetimeFigureOut">
               <a:rPr lang="en-US" smtClean="0"/>
-              <a:t>11/19/12</a:t>
+              <a:t>11/20/12</a:t>
             </a:fld>
             <a:endParaRPr lang="en-US"/>
           </a:p>
@@ -755,7 +756,7 @@
           <a:p>
             <a:fld id="{C8A96B5A-AEDD-3F4A-8AFF-D59A389E47DC}" type="datetimeFigureOut">
               <a:rPr lang="en-US" smtClean="0"/>
-              <a:t>11/19/12</a:t>
+              <a:t>11/20/12</a:t>
             </a:fld>
             <a:endParaRPr lang="en-US"/>
           </a:p>
@@ -925,7 +926,7 @@
           <a:p>
             <a:fld id="{C8A96B5A-AEDD-3F4A-8AFF-D59A389E47DC}" type="datetimeFigureOut">
               <a:rPr lang="en-US" smtClean="0"/>
-              <a:t>11/19/12</a:t>
+              <a:t>11/20/12</a:t>
             </a:fld>
             <a:endParaRPr lang="en-US"/>
           </a:p>
@@ -1105,7 +1106,7 @@
           <a:p>
             <a:fld id="{C8A96B5A-AEDD-3F4A-8AFF-D59A389E47DC}" type="datetimeFigureOut">
               <a:rPr lang="en-US" smtClean="0"/>
-              <a:t>11/19/12</a:t>
+              <a:t>11/20/12</a:t>
             </a:fld>
             <a:endParaRPr lang="en-US"/>
           </a:p>
@@ -1275,7 +1276,7 @@
           <a:p>
             <a:fld id="{C8A96B5A-AEDD-3F4A-8AFF-D59A389E47DC}" type="datetimeFigureOut">
               <a:rPr lang="en-US" smtClean="0"/>
-              <a:t>11/19/12</a:t>
+              <a:t>11/20/12</a:t>
             </a:fld>
             <a:endParaRPr lang="en-US"/>
           </a:p>
@@ -1521,7 +1522,7 @@
           <a:p>
             <a:fld id="{C8A96B5A-AEDD-3F4A-8AFF-D59A389E47DC}" type="datetimeFigureOut">
               <a:rPr lang="en-US" smtClean="0"/>
-              <a:t>11/19/12</a:t>
+              <a:t>11/20/12</a:t>
             </a:fld>
             <a:endParaRPr lang="en-US"/>
           </a:p>
@@ -1809,7 +1810,7 @@
           <a:p>
             <a:fld id="{C8A96B5A-AEDD-3F4A-8AFF-D59A389E47DC}" type="datetimeFigureOut">
               <a:rPr lang="en-US" smtClean="0"/>
-              <a:t>11/19/12</a:t>
+              <a:t>11/20/12</a:t>
             </a:fld>
             <a:endParaRPr lang="en-US"/>
           </a:p>
@@ -2231,7 +2232,7 @@
           <a:p>
             <a:fld id="{C8A96B5A-AEDD-3F4A-8AFF-D59A389E47DC}" type="datetimeFigureOut">
               <a:rPr lang="en-US" smtClean="0"/>
-              <a:t>11/19/12</a:t>
+              <a:t>11/20/12</a:t>
             </a:fld>
             <a:endParaRPr lang="en-US"/>
           </a:p>
@@ -2349,7 +2350,7 @@
           <a:p>
             <a:fld id="{C8A96B5A-AEDD-3F4A-8AFF-D59A389E47DC}" type="datetimeFigureOut">
               <a:rPr lang="en-US" smtClean="0"/>
-              <a:t>11/19/12</a:t>
+              <a:t>11/20/12</a:t>
             </a:fld>
             <a:endParaRPr lang="en-US"/>
           </a:p>
@@ -2444,7 +2445,7 @@
           <a:p>
             <a:fld id="{C8A96B5A-AEDD-3F4A-8AFF-D59A389E47DC}" type="datetimeFigureOut">
               <a:rPr lang="en-US" smtClean="0"/>
-              <a:t>11/19/12</a:t>
+              <a:t>11/20/12</a:t>
             </a:fld>
             <a:endParaRPr lang="en-US"/>
           </a:p>
@@ -2721,7 +2722,7 @@
           <a:p>
             <a:fld id="{C8A96B5A-AEDD-3F4A-8AFF-D59A389E47DC}" type="datetimeFigureOut">
               <a:rPr lang="en-US" smtClean="0"/>
-              <a:t>11/19/12</a:t>
+              <a:t>11/20/12</a:t>
             </a:fld>
             <a:endParaRPr lang="en-US"/>
           </a:p>
@@ -2974,7 +2975,7 @@
           <a:p>
             <a:fld id="{C8A96B5A-AEDD-3F4A-8AFF-D59A389E47DC}" type="datetimeFigureOut">
               <a:rPr lang="en-US" smtClean="0"/>
-              <a:t>11/19/12</a:t>
+              <a:t>11/20/12</a:t>
             </a:fld>
             <a:endParaRPr lang="en-US"/>
           </a:p>
@@ -3187,7 +3188,7 @@
           <a:p>
             <a:fld id="{C8A96B5A-AEDD-3F4A-8AFF-D59A389E47DC}" type="datetimeFigureOut">
               <a:rPr lang="en-US" smtClean="0"/>
-              <a:t>11/19/12</a:t>
+              <a:t>11/20/12</a:t>
             </a:fld>
             <a:endParaRPr lang="en-US"/>
           </a:p>
@@ -27122,6 +27123,105 @@
 </p:sld>
 </file>
 
+<file path=ppt/slides/slide32.xml><?xml version="1.0" encoding="utf-8"?>
+<p:sld xmlns:a="http://schemas.openxmlformats.org/drawingml/2006/main" xmlns:r="http://schemas.openxmlformats.org/officeDocument/2006/relationships" xmlns:p="http://schemas.openxmlformats.org/presentationml/2006/main">
+  <p:cSld>
+    <p:spTree>
+      <p:nvGrpSpPr>
+        <p:cNvPr id="1" name=""/>
+        <p:cNvGrpSpPr/>
+        <p:nvPr/>
+      </p:nvGrpSpPr>
+      <p:grpSpPr>
+        <a:xfrm>
+          <a:off x="0" y="0"/>
+          <a:ext cx="0" cy="0"/>
+          <a:chOff x="0" y="0"/>
+          <a:chExt cx="0" cy="0"/>
+        </a:xfrm>
+      </p:grpSpPr>
+      <p:pic>
+        <p:nvPicPr>
+          <p:cNvPr id="2" name="Picture 1"/>
+          <p:cNvPicPr>
+            <a:picLocks noChangeAspect="1"/>
+          </p:cNvPicPr>
+          <p:nvPr/>
+        </p:nvPicPr>
+        <p:blipFill>
+          <a:blip r:embed="rId2"/>
+          <a:stretch>
+            <a:fillRect/>
+          </a:stretch>
+        </p:blipFill>
+        <p:spPr>
+          <a:xfrm>
+            <a:off x="2120900" y="215900"/>
+            <a:ext cx="4902200" cy="6426200"/>
+          </a:xfrm>
+          <a:prstGeom prst="rect">
+            <a:avLst/>
+          </a:prstGeom>
+        </p:spPr>
+      </p:pic>
+      <p:sp>
+        <p:nvSpPr>
+          <p:cNvPr id="3" name="Rectangle 2"/>
+          <p:cNvSpPr/>
+          <p:nvPr/>
+        </p:nvSpPr>
+        <p:spPr>
+          <a:xfrm>
+            <a:off x="2027307" y="3570995"/>
+            <a:ext cx="699072" cy="1118485"/>
+          </a:xfrm>
+          <a:prstGeom prst="rect">
+            <a:avLst/>
+          </a:prstGeom>
+          <a:solidFill>
+            <a:schemeClr val="bg1"/>
+          </a:solidFill>
+          <a:ln>
+            <a:noFill/>
+          </a:ln>
+          <a:effectLst/>
+        </p:spPr>
+        <p:style>
+          <a:lnRef idx="1">
+            <a:schemeClr val="accent1"/>
+          </a:lnRef>
+          <a:fillRef idx="3">
+            <a:schemeClr val="accent1"/>
+          </a:fillRef>
+          <a:effectRef idx="2">
+            <a:schemeClr val="accent1"/>
+          </a:effectRef>
+          <a:fontRef idx="minor">
+            <a:schemeClr val="lt1"/>
+          </a:fontRef>
+        </p:style>
+        <p:txBody>
+          <a:bodyPr rtlCol="0" anchor="ctr"/>
+          <a:lstStyle/>
+          <a:p>
+            <a:pPr algn="ctr"/>
+            <a:endParaRPr lang="en-US"/>
+          </a:p>
+        </p:txBody>
+      </p:sp>
+    </p:spTree>
+    <p:extLst>
+      <p:ext uri="{BB962C8B-B14F-4D97-AF65-F5344CB8AC3E}">
+        <p14:creationId xmlns:p14="http://schemas.microsoft.com/office/powerpoint/2010/main" val="3693495386"/>
+      </p:ext>
+    </p:extLst>
+  </p:cSld>
+  <p:clrMapOvr>
+    <a:masterClrMapping/>
+  </p:clrMapOvr>
+</p:sld>
+</file>
+
 <file path=ppt/slides/slide4.xml><?xml version="1.0" encoding="utf-8"?>
 <p:sld xmlns:a="http://schemas.openxmlformats.org/drawingml/2006/main" xmlns:r="http://schemas.openxmlformats.org/officeDocument/2006/relationships" xmlns:p="http://schemas.openxmlformats.org/presentationml/2006/main">
   <p:cSld>

</xml_diff>